<commit_message>
update docs , slide
</commit_message>
<xml_diff>
--- a/SWT.pptx
+++ b/SWT.pptx
@@ -22,93 +22,94 @@
     <p:sldId id="260" r:id="rId15"/>
     <p:sldId id="314" r:id="rId16"/>
     <p:sldId id="315" r:id="rId17"/>
-    <p:sldId id="261" r:id="rId18"/>
-    <p:sldId id="266" r:id="rId19"/>
+    <p:sldId id="377" r:id="rId18"/>
+    <p:sldId id="261" r:id="rId19"/>
+    <p:sldId id="266" r:id="rId20"/>
   </p:sldIdLst>
   <p:sldSz cx="9144000" cy="5143500"/>
   <p:notesSz cx="6858000" cy="9144000"/>
   <p:embeddedFontLst>
     <p:embeddedFont>
       <p:font typeface="Proxima Nova" charset="0"/>
-      <p:regular r:id="rId23"/>
-      <p:bold r:id="rId24"/>
-      <p:italic r:id="rId25"/>
-      <p:boldItalic r:id="rId26"/>
+      <p:regular r:id="rId24"/>
+      <p:bold r:id="rId25"/>
+      <p:italic r:id="rId26"/>
+      <p:boldItalic r:id="rId27"/>
     </p:embeddedFont>
     <p:embeddedFont>
       <p:font typeface="Roboto Medium" charset="0"/>
-      <p:regular r:id="rId27"/>
-      <p:bold r:id="rId28"/>
-      <p:italic r:id="rId29"/>
-      <p:boldItalic r:id="rId30"/>
+      <p:regular r:id="rId28"/>
+      <p:bold r:id="rId29"/>
+      <p:italic r:id="rId30"/>
+      <p:boldItalic r:id="rId31"/>
     </p:embeddedFont>
     <p:embeddedFont>
       <p:font typeface="Merriweather Light" charset="0"/>
-      <p:regular r:id="rId31"/>
-      <p:bold r:id="rId32"/>
-      <p:italic r:id="rId33"/>
-      <p:boldItalic r:id="rId34"/>
+      <p:regular r:id="rId32"/>
+      <p:bold r:id="rId33"/>
+      <p:italic r:id="rId34"/>
+      <p:boldItalic r:id="rId35"/>
     </p:embeddedFont>
     <p:embeddedFont>
       <p:font typeface="Vidaloka" charset="0"/>
-      <p:regular r:id="rId35"/>
+      <p:regular r:id="rId36"/>
     </p:embeddedFont>
     <p:embeddedFont>
       <p:font typeface="Proxima Nova Semibold" charset="0"/>
-      <p:regular r:id="rId36"/>
-      <p:bold r:id="rId37"/>
-      <p:boldItalic r:id="rId38"/>
+      <p:regular r:id="rId37"/>
+      <p:bold r:id="rId38"/>
+      <p:boldItalic r:id="rId39"/>
     </p:embeddedFont>
     <p:embeddedFont>
       <p:font typeface="Amatic SC" charset="0"/>
-      <p:regular r:id="rId39"/>
-      <p:bold r:id="rId40"/>
+      <p:regular r:id="rId40"/>
+      <p:bold r:id="rId41"/>
     </p:embeddedFont>
     <p:embeddedFont>
       <p:font typeface="Montserrat" charset="0"/>
-      <p:regular r:id="rId41"/>
-      <p:bold r:id="rId42"/>
-      <p:italic r:id="rId43"/>
-      <p:boldItalic r:id="rId44"/>
+      <p:regular r:id="rId42"/>
+      <p:bold r:id="rId43"/>
+      <p:italic r:id="rId44"/>
+      <p:boldItalic r:id="rId45"/>
     </p:embeddedFont>
     <p:embeddedFont>
       <p:font typeface="Lato" charset="0"/>
-      <p:regular r:id="rId45"/>
-      <p:bold r:id="rId46"/>
-      <p:italic r:id="rId47"/>
-      <p:boldItalic r:id="rId48"/>
+      <p:regular r:id="rId46"/>
+      <p:bold r:id="rId47"/>
+      <p:italic r:id="rId48"/>
+      <p:boldItalic r:id="rId49"/>
     </p:embeddedFont>
     <p:embeddedFont>
       <p:font typeface="Open Sans SemiBold" charset="0"/>
-      <p:regular r:id="rId49"/>
-      <p:bold r:id="rId50"/>
-      <p:italic r:id="rId51"/>
-      <p:boldItalic r:id="rId52"/>
+      <p:regular r:id="rId50"/>
+      <p:bold r:id="rId51"/>
+      <p:italic r:id="rId52"/>
+      <p:boldItalic r:id="rId53"/>
     </p:embeddedFont>
     <p:embeddedFont>
       <p:font typeface="Russo One" charset="0"/>
-      <p:regular r:id="rId53"/>
+      <p:regular r:id="rId54"/>
     </p:embeddedFont>
     <p:embeddedFont>
       <p:font typeface="PT Sans" charset="0"/>
-      <p:regular r:id="rId54"/>
-      <p:bold r:id="rId55"/>
-      <p:italic r:id="rId56"/>
-      <p:boldItalic r:id="rId57"/>
+      <p:regular r:id="rId55"/>
+      <p:bold r:id="rId56"/>
+      <p:italic r:id="rId57"/>
+      <p:boldItalic r:id="rId58"/>
     </p:embeddedFont>
     <p:embeddedFont>
       <p:font typeface="Crimson Text" charset="0"/>
-      <p:regular r:id="rId58"/>
-      <p:bold r:id="rId59"/>
-      <p:italic r:id="rId60"/>
-      <p:boldItalic r:id="rId61"/>
+      <p:regular r:id="rId59"/>
+      <p:bold r:id="rId60"/>
+      <p:italic r:id="rId61"/>
+      <p:boldItalic r:id="rId62"/>
     </p:embeddedFont>
     <p:embeddedFont>
       <p:font typeface="Open Sans" charset="0"/>
-      <p:regular r:id="rId62"/>
-      <p:bold r:id="rId63"/>
-      <p:italic r:id="rId64"/>
-      <p:boldItalic r:id="rId65"/>
+      <p:regular r:id="rId63"/>
+      <p:bold r:id="rId64"/>
+      <p:italic r:id="rId65"/>
+      <p:boldItalic r:id="rId66"/>
     </p:embeddedFont>
   </p:embeddedFontLst>
   <p:defaultTextStyle>
@@ -1377,6 +1378,105 @@
   <p:cSld>
     <p:spTree>
       <p:nvGrpSpPr>
+        <p:cNvPr id="280" name="Shape 280"/>
+        <p:cNvGrpSpPr/>
+        <p:nvPr/>
+      </p:nvGrpSpPr>
+      <p:grpSpPr>
+        <a:xfrm>
+          <a:off x="0" y="0"/>
+          <a:ext cx="0" cy="0"/>
+          <a:chOff x="0" y="0"/>
+          <a:chExt cx="0" cy="0"/>
+        </a:xfrm>
+      </p:grpSpPr>
+      <p:sp>
+        <p:nvSpPr>
+          <p:cNvPr id="281" name="Google Shape;281;gcd8a80d6bc_0_0:notes"/>
+          <p:cNvSpPr/>
+          <p:nvPr>
+            <p:ph type="sldImg" idx="2"/>
+          </p:nvPr>
+        </p:nvSpPr>
+        <p:spPr>
+          <a:xfrm>
+            <a:off x="381300" y="685800"/>
+            <a:ext cx="6096000" cy="3429000"/>
+          </a:xfrm>
+          <a:custGeom>
+            <a:avLst/>
+            <a:gdLst/>
+            <a:ahLst/>
+            <a:cxnLst/>
+            <a:rect l="l" t="t" r="r" b="b"/>
+            <a:pathLst>
+              <a:path w="120000" h="120000" extrusionOk="0">
+                <a:moveTo>
+                  <a:pt x="0" y="0"/>
+                </a:moveTo>
+                <a:lnTo>
+                  <a:pt x="120000" y="0"/>
+                </a:lnTo>
+                <a:lnTo>
+                  <a:pt x="120000" y="120000"/>
+                </a:lnTo>
+                <a:lnTo>
+                  <a:pt x="0" y="120000"/>
+                </a:lnTo>
+                <a:close/>
+              </a:path>
+            </a:pathLst>
+          </a:custGeom>
+        </p:spPr>
+      </p:sp>
+      <p:sp>
+        <p:nvSpPr>
+          <p:cNvPr id="282" name="Google Shape;282;gcd8a80d6bc_0_0:notes"/>
+          <p:cNvSpPr txBox="1"/>
+          <p:nvPr>
+            <p:ph type="body" idx="1"/>
+          </p:nvPr>
+        </p:nvSpPr>
+        <p:spPr>
+          <a:xfrm>
+            <a:off x="685800" y="4343400"/>
+            <a:ext cx="5486400" cy="4114800"/>
+          </a:xfrm>
+          <a:prstGeom prst="rect">
+            <a:avLst/>
+          </a:prstGeom>
+        </p:spPr>
+        <p:txBody>
+          <a:bodyPr spcFirstLastPara="1" wrap="square" lIns="91425" tIns="91425" rIns="91425" bIns="91425" anchor="t" anchorCtr="0">
+            <a:noAutofit/>
+          </a:bodyPr>
+          <a:lstStyle/>
+          <a:p>
+            <a:pPr marL="0" lvl="0" indent="0" algn="l" rtl="0">
+              <a:spcBef>
+                <a:spcPts val="0"/>
+              </a:spcBef>
+              <a:spcAft>
+                <a:spcPts val="0"/>
+              </a:spcAft>
+              <a:buNone/>
+            </a:pPr>
+          </a:p>
+        </p:txBody>
+      </p:sp>
+    </p:spTree>
+  </p:cSld>
+  <p:clrMapOvr>
+    <a:masterClrMapping/>
+  </p:clrMapOvr>
+</p:notes>
+</file>
+
+<file path=ppt/notesSlides/notesSlide16.xml><?xml version="1.0" encoding="utf-8"?>
+<p:notes xmlns:a="http://schemas.openxmlformats.org/drawingml/2006/main" xmlns:r="http://schemas.openxmlformats.org/officeDocument/2006/relationships" xmlns:p="http://schemas.openxmlformats.org/presentationml/2006/main" showMasterPhAnim="0" showMasterSp="0">
+  <p:cSld>
+    <p:spTree>
+      <p:nvGrpSpPr>
         <p:cNvPr id="287" name="Shape 287"/>
         <p:cNvGrpSpPr/>
         <p:nvPr/>
@@ -1471,7 +1571,7 @@
 </p:notes>
 </file>
 
-<file path=ppt/notesSlides/notesSlide16.xml><?xml version="1.0" encoding="utf-8"?>
+<file path=ppt/notesSlides/notesSlide17.xml><?xml version="1.0" encoding="utf-8"?>
 <p:notes xmlns:a="http://schemas.openxmlformats.org/drawingml/2006/main" xmlns:r="http://schemas.openxmlformats.org/officeDocument/2006/relationships" xmlns:p="http://schemas.openxmlformats.org/presentationml/2006/main" showMasterPhAnim="0" showMasterSp="0">
   <p:cSld>
     <p:spTree>
@@ -25860,8 +25960,8 @@
         </p:nvSpPr>
         <p:spPr>
           <a:xfrm>
-            <a:off x="5074775" y="2047523"/>
-            <a:ext cx="2031900" cy="572700"/>
+            <a:off x="4974590" y="2047240"/>
+            <a:ext cx="2621915" cy="572770"/>
           </a:xfrm>
           <a:prstGeom prst="rect">
             <a:avLst/>
@@ -25964,7 +26064,7 @@
             </a:pPr>
             <a:r>
               <a:rPr lang="en-US" altLang="en-GB"/>
-              <a:t>Testing on all basic data types of JavaScript includes Error within many usefull APIs</a:t>
+              <a:t>Testing on all basic data types of JavaScript includes Error within many useful APIs</a:t>
             </a:r>
             <a:endParaRPr lang="en-US" altLang="en-GB"/>
           </a:p>
@@ -27896,7 +27996,7 @@
         <p:spPr>
           <a:xfrm>
             <a:off x="713105" y="445135"/>
-            <a:ext cx="7108190" cy="572770"/>
+            <a:ext cx="7959090" cy="572770"/>
           </a:xfrm>
           <a:prstGeom prst="rect">
             <a:avLst/>
@@ -27919,7 +28019,15 @@
             </a:pPr>
             <a:r>
               <a:rPr lang="en-US" altLang="en-GB"/>
-              <a:t>Extensions (Optional)</a:t>
+              <a:t>Extensions</a:t>
+            </a:r>
+            <a:r>
+              <a:rPr lang="vi-VN" altLang="en-US"/>
+              <a:t> for VScode </a:t>
+            </a:r>
+            <a:r>
+              <a:rPr lang="en-US" altLang="en-GB"/>
+              <a:t>(Optional)</a:t>
             </a:r>
             <a:endParaRPr lang="en-US" altLang="en-GB"/>
           </a:p>
@@ -27962,6 +28070,114 @@
   <p:cSld>
     <p:spTree>
       <p:nvGrpSpPr>
+        <p:cNvPr id="283" name="Shape 283"/>
+        <p:cNvGrpSpPr/>
+        <p:nvPr/>
+      </p:nvGrpSpPr>
+      <p:grpSpPr>
+        <a:xfrm>
+          <a:off x="0" y="0"/>
+          <a:ext cx="0" cy="0"/>
+          <a:chOff x="0" y="0"/>
+          <a:chExt cx="0" cy="0"/>
+        </a:xfrm>
+      </p:grpSpPr>
+      <p:sp>
+        <p:nvSpPr>
+          <p:cNvPr id="284" name="Google Shape;284;p40"/>
+          <p:cNvSpPr txBox="1"/>
+          <p:nvPr>
+            <p:ph type="subTitle" idx="1"/>
+          </p:nvPr>
+        </p:nvSpPr>
+        <p:spPr>
+          <a:xfrm>
+            <a:off x="755650" y="1491615"/>
+            <a:ext cx="7110730" cy="1266190"/>
+          </a:xfrm>
+          <a:prstGeom prst="rect">
+            <a:avLst/>
+          </a:prstGeom>
+        </p:spPr>
+        <p:txBody>
+          <a:bodyPr spcFirstLastPara="1" wrap="square" lIns="91425" tIns="91425" rIns="91425" bIns="91425" anchor="t" anchorCtr="0">
+            <a:noAutofit/>
+          </a:bodyPr>
+          <a:lstStyle/>
+          <a:p>
+            <a:pPr marL="285750" lvl="0" indent="-285750" algn="l" rtl="0">
+              <a:spcBef>
+                <a:spcPts val="0"/>
+              </a:spcBef>
+              <a:spcAft>
+                <a:spcPts val="0"/>
+              </a:spcAft>
+            </a:pPr>
+            <a:r>
+              <a:rPr lang="en-US" altLang="en-GB" sz="1800"/>
+              <a:t>Jest find files with extension are : *.test.js , *.spec.js which contain test suits, test cases.</a:t>
+            </a:r>
+            <a:endParaRPr lang="en-US" altLang="en-GB" sz="1800"/>
+          </a:p>
+        </p:txBody>
+      </p:sp>
+      <p:sp>
+        <p:nvSpPr>
+          <p:cNvPr id="285" name="Google Shape;285;p40"/>
+          <p:cNvSpPr txBox="1"/>
+          <p:nvPr>
+            <p:ph type="title"/>
+          </p:nvPr>
+        </p:nvSpPr>
+        <p:spPr>
+          <a:xfrm>
+            <a:off x="713105" y="445135"/>
+            <a:ext cx="7959090" cy="572770"/>
+          </a:xfrm>
+          <a:prstGeom prst="rect">
+            <a:avLst/>
+          </a:prstGeom>
+        </p:spPr>
+        <p:txBody>
+          <a:bodyPr spcFirstLastPara="1" wrap="square" lIns="91425" tIns="91425" rIns="91425" bIns="91425" anchor="t" anchorCtr="0">
+            <a:noAutofit/>
+          </a:bodyPr>
+          <a:lstStyle/>
+          <a:p>
+            <a:pPr marL="0" lvl="0" indent="0" algn="l" rtl="0">
+              <a:spcBef>
+                <a:spcPts val="0"/>
+              </a:spcBef>
+              <a:spcAft>
+                <a:spcPts val="0"/>
+              </a:spcAft>
+              <a:buNone/>
+            </a:pPr>
+            <a:r>
+              <a:rPr lang="vi-VN" altLang="en-US"/>
+              <a:t>H</a:t>
+            </a:r>
+            <a:r>
+              <a:rPr lang="en-US" altLang="vi-VN"/>
+              <a:t>ow Jest testing js file</a:t>
+            </a:r>
+            <a:endParaRPr lang="en-US" altLang="vi-VN"/>
+          </a:p>
+        </p:txBody>
+      </p:sp>
+    </p:spTree>
+  </p:cSld>
+  <p:clrMapOvr>
+    <a:masterClrMapping/>
+  </p:clrMapOvr>
+</p:sld>
+</file>
+
+<file path=ppt/slides/slide16.xml><?xml version="1.0" encoding="utf-8"?>
+<p:sld xmlns:a="http://schemas.openxmlformats.org/drawingml/2006/main" xmlns:r="http://schemas.openxmlformats.org/officeDocument/2006/relationships" xmlns:p="http://schemas.openxmlformats.org/presentationml/2006/main">
+  <p:cSld>
+    <p:spTree>
+      <p:nvGrpSpPr>
         <p:cNvPr id="290" name="Shape 290"/>
         <p:cNvGrpSpPr/>
         <p:nvPr/>
@@ -28008,7 +28224,7 @@
             </a:pPr>
             <a:r>
               <a:rPr lang="en-US" altLang="en-GB"/>
-              <a:t>Let’s demo it</a:t>
+              <a:t>Let’s demo</a:t>
             </a:r>
             <a:r>
               <a:rPr lang="en-GB"/>
@@ -28026,7 +28242,7 @@
 </p:sld>
 </file>
 
-<file path=ppt/slides/slide16.xml><?xml version="1.0" encoding="utf-8"?>
+<file path=ppt/slides/slide17.xml><?xml version="1.0" encoding="utf-8"?>
 <p:sld xmlns:a="http://schemas.openxmlformats.org/drawingml/2006/main" xmlns:r="http://schemas.openxmlformats.org/officeDocument/2006/relationships" xmlns:p="http://schemas.openxmlformats.org/presentationml/2006/main">
   <p:cSld>
     <p:spTree>
@@ -28762,7 +28978,7 @@
             </a:pPr>
             <a:r>
               <a:rPr lang="en-US" altLang="en-GB"/>
-              <a:t>Some concepts, terms while testing with Jest</a:t>
+              <a:t>Some concepts while testing with Jest</a:t>
             </a:r>
             <a:endParaRPr lang="en-US" altLang="en-GB"/>
           </a:p>
@@ -28842,9 +29058,13 @@
             </a:pPr>
             <a:r>
               <a:rPr lang="en-GB"/>
-              <a:t>02</a:t>
+              <a:t>0</a:t>
             </a:r>
-            <a:endParaRPr lang="en-GB"/>
+            <a:r>
+              <a:rPr lang="vi-VN" altLang="en-GB"/>
+              <a:t>3</a:t>
+            </a:r>
+            <a:endParaRPr lang="vi-VN" altLang="en-GB"/>
           </a:p>
         </p:txBody>
       </p:sp>
@@ -28882,9 +29102,13 @@
             </a:pPr>
             <a:r>
               <a:rPr lang="en-GB"/>
-              <a:t>03</a:t>
+              <a:t>0</a:t>
             </a:r>
-            <a:endParaRPr lang="en-GB"/>
+            <a:r>
+              <a:rPr lang="vi-VN" altLang="en-GB"/>
+              <a:t>2</a:t>
+            </a:r>
+            <a:endParaRPr lang="vi-VN" altLang="en-GB"/>
           </a:p>
         </p:txBody>
       </p:sp>
@@ -30577,7 +30801,13 @@
               </a:pPr>
               <a:r>
                 <a:rPr lang="en-US" altLang="en-GB"/>
-                <a:t>It was designed and built by Christoph Nakazawa</a:t>
+                <a:t>It was designed and built by </a:t>
+              </a:r>
+              <a:r>
+                <a:rPr lang="en-US" altLang="en-GB" i="1">
+                  <a:hlinkClick r:id="rId1" tooltip="" action="ppaction://hlinkfile"/>
+                </a:rPr>
+                <a:t>Christoph Nakazawa</a:t>
               </a:r>
               <a:endParaRPr lang="en-US" altLang="en-GB"/>
             </a:p>
@@ -30608,7 +30838,7 @@
         </p:nvGrpSpPr>
         <p:grpSpPr>
           <a:xfrm>
-            <a:off x="1395730" y="3075940"/>
+            <a:off x="1403350" y="2859405"/>
             <a:ext cx="4244975" cy="453390"/>
             <a:chOff x="2203" y="4957"/>
             <a:chExt cx="6685" cy="714"/>
@@ -31821,7 +32051,7 @@
               <a:rPr lang="en-US" altLang="en-GB">
                 <a:sym typeface="+mn-ea"/>
               </a:rPr>
-              <a:t>Some concepts &amp; terms while testing with Jest</a:t>
+              <a:t>Some concepts while testing with Jest</a:t>
             </a:r>
             <a:endParaRPr lang="en-GB"/>
           </a:p>
@@ -31977,7 +32207,7 @@
         </p:nvSpPr>
         <p:spPr>
           <a:xfrm>
-            <a:off x="713105" y="445135"/>
+            <a:off x="467360" y="1131570"/>
             <a:ext cx="8449310" cy="572770"/>
           </a:xfrm>
           <a:prstGeom prst="rect">
@@ -32012,6 +32242,41 @@
               <a:t>(name, callback)</a:t>
             </a:r>
             <a:endParaRPr lang="en-US" altLang="en-GB"/>
+          </a:p>
+        </p:txBody>
+      </p:sp>
+      <p:sp>
+        <p:nvSpPr>
+          <p:cNvPr id="2" name="Text Box 1"/>
+          <p:cNvSpPr txBox="1"/>
+          <p:nvPr/>
+        </p:nvSpPr>
+        <p:spPr>
+          <a:xfrm>
+            <a:off x="251460" y="483870"/>
+            <a:ext cx="7489190" cy="583565"/>
+          </a:xfrm>
+          <a:prstGeom prst="rect">
+            <a:avLst/>
+          </a:prstGeom>
+          <a:noFill/>
+        </p:spPr>
+        <p:txBody>
+          <a:bodyPr wrap="square" rtlCol="0">
+            <a:spAutoFit/>
+          </a:bodyPr>
+          <a:p>
+            <a:r>
+              <a:rPr lang="en-US" sz="3200">
+                <a:latin typeface="Vidaloka" panose="02000504000000020004" charset="0"/>
+                <a:cs typeface="Vidaloka" panose="02000504000000020004" charset="0"/>
+              </a:rPr>
+              <a:t>Scope</a:t>
+            </a:r>
+            <a:endParaRPr lang="en-US" sz="3200">
+              <a:latin typeface="Vidaloka" panose="02000504000000020004" charset="0"/>
+              <a:cs typeface="Vidaloka" panose="02000504000000020004" charset="0"/>
+            </a:endParaRPr>
           </a:p>
         </p:txBody>
       </p:sp>
@@ -32050,7 +32315,7 @@
         </p:nvSpPr>
         <p:spPr>
           <a:xfrm>
-            <a:off x="755650" y="1491615"/>
+            <a:off x="539750" y="1704340"/>
             <a:ext cx="7794625" cy="2393315"/>
           </a:xfrm>
           <a:prstGeom prst="rect">
@@ -32123,7 +32388,15 @@
             </a:pPr>
             <a:r>
               <a:rPr lang="en-US" altLang="en-GB" sz="1800"/>
-              <a:t>The second one is a callback function of testing which may include one or many test case (with </a:t>
+              <a:t>The second one is a callback function of testing which may include one or many </a:t>
+            </a:r>
+            <a:r>
+              <a:rPr lang="en-US" altLang="en-GB" sz="1800" b="1"/>
+              <a:t>test case</a:t>
+            </a:r>
+            <a:r>
+              <a:rPr lang="en-US" altLang="en-GB" sz="1800"/>
+              <a:t> (with </a:t>
             </a:r>
             <a:r>
               <a:rPr lang="en-US" altLang="en-GB" sz="1800" i="1">
@@ -32182,7 +32455,7 @@
         </p:nvSpPr>
         <p:spPr>
           <a:xfrm>
-            <a:off x="713105" y="445135"/>
+            <a:off x="347345" y="1059815"/>
             <a:ext cx="8449310" cy="572770"/>
           </a:xfrm>
           <a:prstGeom prst="rect">
@@ -32220,6 +32493,41 @@
               <a:t>(name, callback) </a:t>
             </a:r>
             <a:endParaRPr lang="en-US" altLang="en-GB"/>
+          </a:p>
+        </p:txBody>
+      </p:sp>
+      <p:sp>
+        <p:nvSpPr>
+          <p:cNvPr id="1" name="Text Box 0"/>
+          <p:cNvSpPr txBox="1"/>
+          <p:nvPr/>
+        </p:nvSpPr>
+        <p:spPr>
+          <a:xfrm>
+            <a:off x="251460" y="411480"/>
+            <a:ext cx="7489190" cy="583565"/>
+          </a:xfrm>
+          <a:prstGeom prst="rect">
+            <a:avLst/>
+          </a:prstGeom>
+          <a:noFill/>
+        </p:spPr>
+        <p:txBody>
+          <a:bodyPr wrap="square" rtlCol="0">
+            <a:spAutoFit/>
+          </a:bodyPr>
+          <a:p>
+            <a:r>
+              <a:rPr lang="en-US" sz="3200">
+                <a:latin typeface="Vidaloka" panose="02000504000000020004" charset="0"/>
+                <a:cs typeface="Vidaloka" panose="02000504000000020004" charset="0"/>
+              </a:rPr>
+              <a:t>Scope</a:t>
+            </a:r>
+            <a:endParaRPr lang="en-US" sz="3200">
+              <a:latin typeface="Vidaloka" panose="02000504000000020004" charset="0"/>
+              <a:cs typeface="Vidaloka" panose="02000504000000020004" charset="0"/>
+            </a:endParaRPr>
           </a:p>
         </p:txBody>
       </p:sp>
@@ -32258,7 +32566,7 @@
         </p:nvSpPr>
         <p:spPr>
           <a:xfrm>
-            <a:off x="755650" y="1491615"/>
+            <a:off x="611505" y="2931795"/>
             <a:ext cx="7794625" cy="2393315"/>
           </a:xfrm>
           <a:prstGeom prst="rect">
@@ -32326,6 +32634,10 @@
               <a:rPr lang="en-US" altLang="en-GB" sz="1800"/>
               <a:t> determine the expected value of function</a:t>
             </a:r>
+            <a:r>
+              <a:rPr lang="vi-VN" altLang="en-US" sz="1800"/>
+              <a:t>. </a:t>
+            </a:r>
             <a:endParaRPr lang="en-US" altLang="en-GB" sz="1800"/>
           </a:p>
           <a:p>
@@ -32438,7 +32750,16 @@
                 </a:solidFill>
                 <a:sym typeface="+mn-ea"/>
               </a:rPr>
-              <a:t>).equalsTo</a:t>
+              <a:t>).</a:t>
+            </a:r>
+            <a:r>
+              <a:rPr lang="vi-VN" altLang="en-US" sz="1800" i="1">
+                <a:solidFill>
+                  <a:srgbClr val="FA919B"/>
+                </a:solidFill>
+                <a:sym typeface="+mn-ea"/>
+              </a:rPr>
+              <a:t>toEqual</a:t>
             </a:r>
             <a:r>
               <a:rPr lang="en-US" altLang="en-GB" sz="1800">
@@ -32526,7 +32847,7 @@
         </p:nvSpPr>
         <p:spPr>
           <a:xfrm>
-            <a:off x="713105" y="445135"/>
+            <a:off x="467360" y="1059815"/>
             <a:ext cx="8449310" cy="572770"/>
           </a:xfrm>
           <a:prstGeom prst="rect">
@@ -32573,10 +32894,13 @@
               <a:t>)</a:t>
             </a:r>
             <a:r>
-              <a:rPr lang="en-US" altLang="en-GB">
+              <a:rPr lang="vi-VN" altLang="en-US">
+                <a:solidFill>
+                  <a:srgbClr val="FA919B"/>
+                </a:solidFill>
                 <a:sym typeface="+mn-ea"/>
               </a:rPr>
-              <a:t>, </a:t>
+              <a:t>.</a:t>
             </a:r>
             <a:r>
               <a:rPr lang="en-US" altLang="en-GB">
@@ -32603,6 +32927,1031 @@
               <a:t>)</a:t>
             </a:r>
             <a:endParaRPr lang="en-US" altLang="en-GB">
+              <a:solidFill>
+                <a:srgbClr val="FA919B"/>
+              </a:solidFill>
+              <a:sym typeface="+mn-ea"/>
+            </a:endParaRPr>
+          </a:p>
+        </p:txBody>
+      </p:sp>
+      <p:sp>
+        <p:nvSpPr>
+          <p:cNvPr id="1" name="Text Box 0"/>
+          <p:cNvSpPr txBox="1"/>
+          <p:nvPr/>
+        </p:nvSpPr>
+        <p:spPr>
+          <a:xfrm>
+            <a:off x="251460" y="483870"/>
+            <a:ext cx="7489190" cy="583565"/>
+          </a:xfrm>
+          <a:prstGeom prst="rect">
+            <a:avLst/>
+          </a:prstGeom>
+          <a:noFill/>
+        </p:spPr>
+        <p:txBody>
+          <a:bodyPr wrap="square" rtlCol="0">
+            <a:spAutoFit/>
+          </a:bodyPr>
+          <a:p>
+            <a:r>
+              <a:rPr lang="en-US" sz="3200">
+                <a:latin typeface="Vidaloka" panose="02000504000000020004" charset="0"/>
+                <a:cs typeface="Vidaloka" panose="02000504000000020004" charset="0"/>
+              </a:rPr>
+              <a:t>Test case</a:t>
+            </a:r>
+            <a:endParaRPr lang="en-US" sz="3200">
+              <a:latin typeface="Vidaloka" panose="02000504000000020004" charset="0"/>
+              <a:cs typeface="Vidaloka" panose="02000504000000020004" charset="0"/>
+            </a:endParaRPr>
+          </a:p>
+        </p:txBody>
+      </p:sp>
+      <p:sp>
+        <p:nvSpPr>
+          <p:cNvPr id="3" name="Google Shape;285;p40"/>
+          <p:cNvSpPr txBox="1"/>
+          <p:nvPr/>
+        </p:nvSpPr>
+        <p:spPr>
+          <a:xfrm>
+            <a:off x="467360" y="1632585"/>
+            <a:ext cx="8449310" cy="572770"/>
+          </a:xfrm>
+          <a:prstGeom prst="rect">
+            <a:avLst/>
+          </a:prstGeom>
+          <a:noFill/>
+          <a:ln>
+            <a:noFill/>
+          </a:ln>
+        </p:spPr>
+        <p:txBody>
+          <a:bodyPr wrap="square" lIns="91425" tIns="91425" rIns="91425" bIns="91425" anchor="t" anchorCtr="0">
+            <a:noAutofit/>
+          </a:bodyPr>
+          <a:lstStyle>
+            <a:defPPr marR="0" lvl="0" algn="l" rtl="0">
+              <a:lnSpc>
+                <a:spcPct val="100000"/>
+              </a:lnSpc>
+              <a:spcBef>
+                <a:spcPts val="0"/>
+              </a:spcBef>
+              <a:spcAft>
+                <a:spcPts val="0"/>
+              </a:spcAft>
+            </a:defPPr>
+            <a:lvl1pPr marR="0" lvl="0" algn="l" rtl="0">
+              <a:lnSpc>
+                <a:spcPct val="100000"/>
+              </a:lnSpc>
+              <a:spcBef>
+                <a:spcPts val="0"/>
+              </a:spcBef>
+              <a:spcAft>
+                <a:spcPts val="0"/>
+              </a:spcAft>
+              <a:buClr>
+                <a:schemeClr val="dk1"/>
+              </a:buClr>
+              <a:buSzPts val="3000"/>
+              <a:buFont typeface="Vidaloka" panose="02000504000000020004"/>
+              <a:buNone/>
+              <a:defRPr sz="3000" b="0" i="0" u="none" strike="noStrike" cap="none">
+                <a:solidFill>
+                  <a:schemeClr val="dk1"/>
+                </a:solidFill>
+                <a:latin typeface="Vidaloka" panose="02000504000000020004"/>
+                <a:ea typeface="Vidaloka" panose="02000504000000020004"/>
+                <a:cs typeface="Vidaloka" panose="02000504000000020004"/>
+                <a:sym typeface="Vidaloka" panose="02000504000000020004"/>
+              </a:defRPr>
+            </a:lvl1pPr>
+            <a:lvl2pPr marR="0" lvl="1" algn="l" rtl="0">
+              <a:lnSpc>
+                <a:spcPct val="100000"/>
+              </a:lnSpc>
+              <a:spcBef>
+                <a:spcPts val="0"/>
+              </a:spcBef>
+              <a:spcAft>
+                <a:spcPts val="0"/>
+              </a:spcAft>
+              <a:buClr>
+                <a:schemeClr val="dk1"/>
+              </a:buClr>
+              <a:buSzPts val="3000"/>
+              <a:buFont typeface="Arial" panose="020B0604020202020204"/>
+              <a:buNone/>
+              <a:defRPr sz="3000" b="0" i="1" u="none" strike="noStrike" cap="none">
+                <a:solidFill>
+                  <a:schemeClr val="dk1"/>
+                </a:solidFill>
+                <a:latin typeface="Arial" panose="020B0604020202020204"/>
+                <a:ea typeface="Arial" panose="020B0604020202020204"/>
+                <a:cs typeface="Arial" panose="020B0604020202020204"/>
+                <a:sym typeface="Arial" panose="020B0604020202020204"/>
+              </a:defRPr>
+            </a:lvl2pPr>
+            <a:lvl3pPr marR="0" lvl="2" algn="l" rtl="0">
+              <a:lnSpc>
+                <a:spcPct val="100000"/>
+              </a:lnSpc>
+              <a:spcBef>
+                <a:spcPts val="0"/>
+              </a:spcBef>
+              <a:spcAft>
+                <a:spcPts val="0"/>
+              </a:spcAft>
+              <a:buClr>
+                <a:schemeClr val="dk1"/>
+              </a:buClr>
+              <a:buSzPts val="3000"/>
+              <a:buFont typeface="Arial" panose="020B0604020202020204"/>
+              <a:buNone/>
+              <a:defRPr sz="3000" b="0" i="1" u="none" strike="noStrike" cap="none">
+                <a:solidFill>
+                  <a:schemeClr val="dk1"/>
+                </a:solidFill>
+                <a:latin typeface="Arial" panose="020B0604020202020204"/>
+                <a:ea typeface="Arial" panose="020B0604020202020204"/>
+                <a:cs typeface="Arial" panose="020B0604020202020204"/>
+                <a:sym typeface="Arial" panose="020B0604020202020204"/>
+              </a:defRPr>
+            </a:lvl3pPr>
+            <a:lvl4pPr marR="0" lvl="3" algn="l" rtl="0">
+              <a:lnSpc>
+                <a:spcPct val="100000"/>
+              </a:lnSpc>
+              <a:spcBef>
+                <a:spcPts val="0"/>
+              </a:spcBef>
+              <a:spcAft>
+                <a:spcPts val="0"/>
+              </a:spcAft>
+              <a:buClr>
+                <a:schemeClr val="dk1"/>
+              </a:buClr>
+              <a:buSzPts val="3000"/>
+              <a:buFont typeface="Arial" panose="020B0604020202020204"/>
+              <a:buNone/>
+              <a:defRPr sz="3000" b="0" i="1" u="none" strike="noStrike" cap="none">
+                <a:solidFill>
+                  <a:schemeClr val="dk1"/>
+                </a:solidFill>
+                <a:latin typeface="Arial" panose="020B0604020202020204"/>
+                <a:ea typeface="Arial" panose="020B0604020202020204"/>
+                <a:cs typeface="Arial" panose="020B0604020202020204"/>
+                <a:sym typeface="Arial" panose="020B0604020202020204"/>
+              </a:defRPr>
+            </a:lvl4pPr>
+            <a:lvl5pPr marR="0" lvl="4" algn="l" rtl="0">
+              <a:lnSpc>
+                <a:spcPct val="100000"/>
+              </a:lnSpc>
+              <a:spcBef>
+                <a:spcPts val="0"/>
+              </a:spcBef>
+              <a:spcAft>
+                <a:spcPts val="0"/>
+              </a:spcAft>
+              <a:buClr>
+                <a:schemeClr val="dk1"/>
+              </a:buClr>
+              <a:buSzPts val="3000"/>
+              <a:buFont typeface="Arial" panose="020B0604020202020204"/>
+              <a:buNone/>
+              <a:defRPr sz="3000" b="0" i="1" u="none" strike="noStrike" cap="none">
+                <a:solidFill>
+                  <a:schemeClr val="dk1"/>
+                </a:solidFill>
+                <a:latin typeface="Arial" panose="020B0604020202020204"/>
+                <a:ea typeface="Arial" panose="020B0604020202020204"/>
+                <a:cs typeface="Arial" panose="020B0604020202020204"/>
+                <a:sym typeface="Arial" panose="020B0604020202020204"/>
+              </a:defRPr>
+            </a:lvl5pPr>
+            <a:lvl6pPr marR="0" lvl="5" algn="l" rtl="0">
+              <a:lnSpc>
+                <a:spcPct val="100000"/>
+              </a:lnSpc>
+              <a:spcBef>
+                <a:spcPts val="0"/>
+              </a:spcBef>
+              <a:spcAft>
+                <a:spcPts val="0"/>
+              </a:spcAft>
+              <a:buClr>
+                <a:schemeClr val="dk1"/>
+              </a:buClr>
+              <a:buSzPts val="3000"/>
+              <a:buFont typeface="Arial" panose="020B0604020202020204"/>
+              <a:buNone/>
+              <a:defRPr sz="3000" b="0" i="1" u="none" strike="noStrike" cap="none">
+                <a:solidFill>
+                  <a:schemeClr val="dk1"/>
+                </a:solidFill>
+                <a:latin typeface="Arial" panose="020B0604020202020204"/>
+                <a:ea typeface="Arial" panose="020B0604020202020204"/>
+                <a:cs typeface="Arial" panose="020B0604020202020204"/>
+                <a:sym typeface="Arial" panose="020B0604020202020204"/>
+              </a:defRPr>
+            </a:lvl6pPr>
+            <a:lvl7pPr marR="0" lvl="6" algn="l" rtl="0">
+              <a:lnSpc>
+                <a:spcPct val="100000"/>
+              </a:lnSpc>
+              <a:spcBef>
+                <a:spcPts val="0"/>
+              </a:spcBef>
+              <a:spcAft>
+                <a:spcPts val="0"/>
+              </a:spcAft>
+              <a:buClr>
+                <a:schemeClr val="dk1"/>
+              </a:buClr>
+              <a:buSzPts val="3000"/>
+              <a:buFont typeface="Arial" panose="020B0604020202020204"/>
+              <a:buNone/>
+              <a:defRPr sz="3000" b="0" i="1" u="none" strike="noStrike" cap="none">
+                <a:solidFill>
+                  <a:schemeClr val="dk1"/>
+                </a:solidFill>
+                <a:latin typeface="Arial" panose="020B0604020202020204"/>
+                <a:ea typeface="Arial" panose="020B0604020202020204"/>
+                <a:cs typeface="Arial" panose="020B0604020202020204"/>
+                <a:sym typeface="Arial" panose="020B0604020202020204"/>
+              </a:defRPr>
+            </a:lvl7pPr>
+            <a:lvl8pPr marR="0" lvl="7" algn="l" rtl="0">
+              <a:lnSpc>
+                <a:spcPct val="100000"/>
+              </a:lnSpc>
+              <a:spcBef>
+                <a:spcPts val="0"/>
+              </a:spcBef>
+              <a:spcAft>
+                <a:spcPts val="0"/>
+              </a:spcAft>
+              <a:buClr>
+                <a:schemeClr val="dk1"/>
+              </a:buClr>
+              <a:buSzPts val="3000"/>
+              <a:buFont typeface="Arial" panose="020B0604020202020204"/>
+              <a:buNone/>
+              <a:defRPr sz="3000" b="0" i="1" u="none" strike="noStrike" cap="none">
+                <a:solidFill>
+                  <a:schemeClr val="dk1"/>
+                </a:solidFill>
+                <a:latin typeface="Arial" panose="020B0604020202020204"/>
+                <a:ea typeface="Arial" panose="020B0604020202020204"/>
+                <a:cs typeface="Arial" panose="020B0604020202020204"/>
+                <a:sym typeface="Arial" panose="020B0604020202020204"/>
+              </a:defRPr>
+            </a:lvl8pPr>
+            <a:lvl9pPr marR="0" lvl="8" algn="l" rtl="0">
+              <a:lnSpc>
+                <a:spcPct val="100000"/>
+              </a:lnSpc>
+              <a:spcBef>
+                <a:spcPts val="0"/>
+              </a:spcBef>
+              <a:spcAft>
+                <a:spcPts val="0"/>
+              </a:spcAft>
+              <a:buClr>
+                <a:schemeClr val="dk1"/>
+              </a:buClr>
+              <a:buSzPts val="3000"/>
+              <a:buFont typeface="Arial" panose="020B0604020202020204"/>
+              <a:buNone/>
+              <a:defRPr sz="3000" b="0" i="1" u="none" strike="noStrike" cap="none">
+                <a:solidFill>
+                  <a:schemeClr val="dk1"/>
+                </a:solidFill>
+                <a:latin typeface="Arial" panose="020B0604020202020204"/>
+                <a:ea typeface="Arial" panose="020B0604020202020204"/>
+                <a:cs typeface="Arial" panose="020B0604020202020204"/>
+                <a:sym typeface="Arial" panose="020B0604020202020204"/>
+              </a:defRPr>
+            </a:lvl9pPr>
+          </a:lstStyle>
+          <a:p>
+            <a:pPr marL="0" lvl="0" indent="0" algn="l" rtl="0">
+              <a:spcBef>
+                <a:spcPts val="0"/>
+              </a:spcBef>
+              <a:spcAft>
+                <a:spcPts val="0"/>
+              </a:spcAft>
+              <a:buNone/>
+            </a:pPr>
+            <a:r>
+              <a:rPr lang="en-US" altLang="en-GB">
+                <a:solidFill>
+                  <a:srgbClr val="FA919B"/>
+                </a:solidFill>
+                <a:sym typeface="+mn-ea"/>
+              </a:rPr>
+              <a:t>expect(</a:t>
+            </a:r>
+            <a:r>
+              <a:rPr lang="en-US" altLang="en-GB">
+                <a:sym typeface="+mn-ea"/>
+              </a:rPr>
+              <a:t>actualResult</a:t>
+            </a:r>
+            <a:r>
+              <a:rPr lang="en-US" altLang="en-GB">
+                <a:solidFill>
+                  <a:srgbClr val="FA919B"/>
+                </a:solidFill>
+                <a:sym typeface="+mn-ea"/>
+              </a:rPr>
+              <a:t>)</a:t>
+            </a:r>
+            <a:r>
+              <a:rPr lang="vi-VN" altLang="en-US">
+                <a:solidFill>
+                  <a:srgbClr val="FA919B"/>
+                </a:solidFill>
+                <a:sym typeface="+mn-ea"/>
+              </a:rPr>
+              <a:t>.</a:t>
+            </a:r>
+            <a:r>
+              <a:rPr lang="en-US" altLang="en-GB">
+                <a:solidFill>
+                  <a:srgbClr val="FA919B"/>
+                </a:solidFill>
+                <a:sym typeface="+mn-ea"/>
+              </a:rPr>
+              <a:t>toEqual(</a:t>
+            </a:r>
+            <a:r>
+              <a:rPr lang="en-US" altLang="en-GB">
+                <a:sym typeface="+mn-ea"/>
+              </a:rPr>
+              <a:t>expectedValue</a:t>
+            </a:r>
+            <a:r>
+              <a:rPr lang="en-US" altLang="en-GB">
+                <a:solidFill>
+                  <a:srgbClr val="FA919B"/>
+                </a:solidFill>
+                <a:sym typeface="+mn-ea"/>
+              </a:rPr>
+              <a:t>)</a:t>
+            </a:r>
+            <a:endParaRPr lang="en-US" altLang="en-GB">
+              <a:solidFill>
+                <a:srgbClr val="FA919B"/>
+              </a:solidFill>
+              <a:sym typeface="+mn-ea"/>
+            </a:endParaRPr>
+          </a:p>
+        </p:txBody>
+      </p:sp>
+      <p:sp>
+        <p:nvSpPr>
+          <p:cNvPr id="4" name="Google Shape;285;p40"/>
+          <p:cNvSpPr txBox="1"/>
+          <p:nvPr/>
+        </p:nvSpPr>
+        <p:spPr>
+          <a:xfrm>
+            <a:off x="467360" y="2205355"/>
+            <a:ext cx="8654415" cy="572770"/>
+          </a:xfrm>
+          <a:prstGeom prst="rect">
+            <a:avLst/>
+          </a:prstGeom>
+          <a:noFill/>
+          <a:ln>
+            <a:noFill/>
+          </a:ln>
+        </p:spPr>
+        <p:txBody>
+          <a:bodyPr wrap="square" lIns="91425" tIns="91425" rIns="91425" bIns="91425" anchor="t" anchorCtr="0">
+            <a:noAutofit/>
+          </a:bodyPr>
+          <a:lstStyle>
+            <a:defPPr marR="0" lvl="0" algn="l" rtl="0">
+              <a:lnSpc>
+                <a:spcPct val="100000"/>
+              </a:lnSpc>
+              <a:spcBef>
+                <a:spcPts val="0"/>
+              </a:spcBef>
+              <a:spcAft>
+                <a:spcPts val="0"/>
+              </a:spcAft>
+            </a:defPPr>
+            <a:lvl1pPr marR="0" lvl="0" algn="l" rtl="0">
+              <a:lnSpc>
+                <a:spcPct val="100000"/>
+              </a:lnSpc>
+              <a:spcBef>
+                <a:spcPts val="0"/>
+              </a:spcBef>
+              <a:spcAft>
+                <a:spcPts val="0"/>
+              </a:spcAft>
+              <a:buClr>
+                <a:schemeClr val="dk1"/>
+              </a:buClr>
+              <a:buSzPts val="3000"/>
+              <a:buFont typeface="Vidaloka" panose="02000504000000020004"/>
+              <a:buNone/>
+              <a:defRPr sz="3000" b="0" i="0" u="none" strike="noStrike" cap="none">
+                <a:solidFill>
+                  <a:schemeClr val="dk1"/>
+                </a:solidFill>
+                <a:latin typeface="Vidaloka" panose="02000504000000020004"/>
+                <a:ea typeface="Vidaloka" panose="02000504000000020004"/>
+                <a:cs typeface="Vidaloka" panose="02000504000000020004"/>
+                <a:sym typeface="Vidaloka" panose="02000504000000020004"/>
+              </a:defRPr>
+            </a:lvl1pPr>
+            <a:lvl2pPr marR="0" lvl="1" algn="l" rtl="0">
+              <a:lnSpc>
+                <a:spcPct val="100000"/>
+              </a:lnSpc>
+              <a:spcBef>
+                <a:spcPts val="0"/>
+              </a:spcBef>
+              <a:spcAft>
+                <a:spcPts val="0"/>
+              </a:spcAft>
+              <a:buClr>
+                <a:schemeClr val="dk1"/>
+              </a:buClr>
+              <a:buSzPts val="3000"/>
+              <a:buFont typeface="Arial" panose="020B0604020202020204"/>
+              <a:buNone/>
+              <a:defRPr sz="3000" b="0" i="1" u="none" strike="noStrike" cap="none">
+                <a:solidFill>
+                  <a:schemeClr val="dk1"/>
+                </a:solidFill>
+                <a:latin typeface="Arial" panose="020B0604020202020204"/>
+                <a:ea typeface="Arial" panose="020B0604020202020204"/>
+                <a:cs typeface="Arial" panose="020B0604020202020204"/>
+                <a:sym typeface="Arial" panose="020B0604020202020204"/>
+              </a:defRPr>
+            </a:lvl2pPr>
+            <a:lvl3pPr marR="0" lvl="2" algn="l" rtl="0">
+              <a:lnSpc>
+                <a:spcPct val="100000"/>
+              </a:lnSpc>
+              <a:spcBef>
+                <a:spcPts val="0"/>
+              </a:spcBef>
+              <a:spcAft>
+                <a:spcPts val="0"/>
+              </a:spcAft>
+              <a:buClr>
+                <a:schemeClr val="dk1"/>
+              </a:buClr>
+              <a:buSzPts val="3000"/>
+              <a:buFont typeface="Arial" panose="020B0604020202020204"/>
+              <a:buNone/>
+              <a:defRPr sz="3000" b="0" i="1" u="none" strike="noStrike" cap="none">
+                <a:solidFill>
+                  <a:schemeClr val="dk1"/>
+                </a:solidFill>
+                <a:latin typeface="Arial" panose="020B0604020202020204"/>
+                <a:ea typeface="Arial" panose="020B0604020202020204"/>
+                <a:cs typeface="Arial" panose="020B0604020202020204"/>
+                <a:sym typeface="Arial" panose="020B0604020202020204"/>
+              </a:defRPr>
+            </a:lvl3pPr>
+            <a:lvl4pPr marR="0" lvl="3" algn="l" rtl="0">
+              <a:lnSpc>
+                <a:spcPct val="100000"/>
+              </a:lnSpc>
+              <a:spcBef>
+                <a:spcPts val="0"/>
+              </a:spcBef>
+              <a:spcAft>
+                <a:spcPts val="0"/>
+              </a:spcAft>
+              <a:buClr>
+                <a:schemeClr val="dk1"/>
+              </a:buClr>
+              <a:buSzPts val="3000"/>
+              <a:buFont typeface="Arial" panose="020B0604020202020204"/>
+              <a:buNone/>
+              <a:defRPr sz="3000" b="0" i="1" u="none" strike="noStrike" cap="none">
+                <a:solidFill>
+                  <a:schemeClr val="dk1"/>
+                </a:solidFill>
+                <a:latin typeface="Arial" panose="020B0604020202020204"/>
+                <a:ea typeface="Arial" panose="020B0604020202020204"/>
+                <a:cs typeface="Arial" panose="020B0604020202020204"/>
+                <a:sym typeface="Arial" panose="020B0604020202020204"/>
+              </a:defRPr>
+            </a:lvl4pPr>
+            <a:lvl5pPr marR="0" lvl="4" algn="l" rtl="0">
+              <a:lnSpc>
+                <a:spcPct val="100000"/>
+              </a:lnSpc>
+              <a:spcBef>
+                <a:spcPts val="0"/>
+              </a:spcBef>
+              <a:spcAft>
+                <a:spcPts val="0"/>
+              </a:spcAft>
+              <a:buClr>
+                <a:schemeClr val="dk1"/>
+              </a:buClr>
+              <a:buSzPts val="3000"/>
+              <a:buFont typeface="Arial" panose="020B0604020202020204"/>
+              <a:buNone/>
+              <a:defRPr sz="3000" b="0" i="1" u="none" strike="noStrike" cap="none">
+                <a:solidFill>
+                  <a:schemeClr val="dk1"/>
+                </a:solidFill>
+                <a:latin typeface="Arial" panose="020B0604020202020204"/>
+                <a:ea typeface="Arial" panose="020B0604020202020204"/>
+                <a:cs typeface="Arial" panose="020B0604020202020204"/>
+                <a:sym typeface="Arial" panose="020B0604020202020204"/>
+              </a:defRPr>
+            </a:lvl5pPr>
+            <a:lvl6pPr marR="0" lvl="5" algn="l" rtl="0">
+              <a:lnSpc>
+                <a:spcPct val="100000"/>
+              </a:lnSpc>
+              <a:spcBef>
+                <a:spcPts val="0"/>
+              </a:spcBef>
+              <a:spcAft>
+                <a:spcPts val="0"/>
+              </a:spcAft>
+              <a:buClr>
+                <a:schemeClr val="dk1"/>
+              </a:buClr>
+              <a:buSzPts val="3000"/>
+              <a:buFont typeface="Arial" panose="020B0604020202020204"/>
+              <a:buNone/>
+              <a:defRPr sz="3000" b="0" i="1" u="none" strike="noStrike" cap="none">
+                <a:solidFill>
+                  <a:schemeClr val="dk1"/>
+                </a:solidFill>
+                <a:latin typeface="Arial" panose="020B0604020202020204"/>
+                <a:ea typeface="Arial" panose="020B0604020202020204"/>
+                <a:cs typeface="Arial" panose="020B0604020202020204"/>
+                <a:sym typeface="Arial" panose="020B0604020202020204"/>
+              </a:defRPr>
+            </a:lvl6pPr>
+            <a:lvl7pPr marR="0" lvl="6" algn="l" rtl="0">
+              <a:lnSpc>
+                <a:spcPct val="100000"/>
+              </a:lnSpc>
+              <a:spcBef>
+                <a:spcPts val="0"/>
+              </a:spcBef>
+              <a:spcAft>
+                <a:spcPts val="0"/>
+              </a:spcAft>
+              <a:buClr>
+                <a:schemeClr val="dk1"/>
+              </a:buClr>
+              <a:buSzPts val="3000"/>
+              <a:buFont typeface="Arial" panose="020B0604020202020204"/>
+              <a:buNone/>
+              <a:defRPr sz="3000" b="0" i="1" u="none" strike="noStrike" cap="none">
+                <a:solidFill>
+                  <a:schemeClr val="dk1"/>
+                </a:solidFill>
+                <a:latin typeface="Arial" panose="020B0604020202020204"/>
+                <a:ea typeface="Arial" panose="020B0604020202020204"/>
+                <a:cs typeface="Arial" panose="020B0604020202020204"/>
+                <a:sym typeface="Arial" panose="020B0604020202020204"/>
+              </a:defRPr>
+            </a:lvl7pPr>
+            <a:lvl8pPr marR="0" lvl="7" algn="l" rtl="0">
+              <a:lnSpc>
+                <a:spcPct val="100000"/>
+              </a:lnSpc>
+              <a:spcBef>
+                <a:spcPts val="0"/>
+              </a:spcBef>
+              <a:spcAft>
+                <a:spcPts val="0"/>
+              </a:spcAft>
+              <a:buClr>
+                <a:schemeClr val="dk1"/>
+              </a:buClr>
+              <a:buSzPts val="3000"/>
+              <a:buFont typeface="Arial" panose="020B0604020202020204"/>
+              <a:buNone/>
+              <a:defRPr sz="3000" b="0" i="1" u="none" strike="noStrike" cap="none">
+                <a:solidFill>
+                  <a:schemeClr val="dk1"/>
+                </a:solidFill>
+                <a:latin typeface="Arial" panose="020B0604020202020204"/>
+                <a:ea typeface="Arial" panose="020B0604020202020204"/>
+                <a:cs typeface="Arial" panose="020B0604020202020204"/>
+                <a:sym typeface="Arial" panose="020B0604020202020204"/>
+              </a:defRPr>
+            </a:lvl8pPr>
+            <a:lvl9pPr marR="0" lvl="8" algn="l" rtl="0">
+              <a:lnSpc>
+                <a:spcPct val="100000"/>
+              </a:lnSpc>
+              <a:spcBef>
+                <a:spcPts val="0"/>
+              </a:spcBef>
+              <a:spcAft>
+                <a:spcPts val="0"/>
+              </a:spcAft>
+              <a:buClr>
+                <a:schemeClr val="dk1"/>
+              </a:buClr>
+              <a:buSzPts val="3000"/>
+              <a:buFont typeface="Arial" panose="020B0604020202020204"/>
+              <a:buNone/>
+              <a:defRPr sz="3000" b="0" i="1" u="none" strike="noStrike" cap="none">
+                <a:solidFill>
+                  <a:schemeClr val="dk1"/>
+                </a:solidFill>
+                <a:latin typeface="Arial" panose="020B0604020202020204"/>
+                <a:ea typeface="Arial" panose="020B0604020202020204"/>
+                <a:cs typeface="Arial" panose="020B0604020202020204"/>
+                <a:sym typeface="Arial" panose="020B0604020202020204"/>
+              </a:defRPr>
+            </a:lvl9pPr>
+          </a:lstStyle>
+          <a:p>
+            <a:pPr marL="0" lvl="0" indent="0" algn="l" rtl="0">
+              <a:spcBef>
+                <a:spcPts val="0"/>
+              </a:spcBef>
+              <a:spcAft>
+                <a:spcPts val="0"/>
+              </a:spcAft>
+              <a:buNone/>
+            </a:pPr>
+            <a:r>
+              <a:rPr lang="en-US" altLang="en-GB">
+                <a:solidFill>
+                  <a:srgbClr val="FA919B"/>
+                </a:solidFill>
+                <a:sym typeface="+mn-ea"/>
+              </a:rPr>
+              <a:t>expect(</a:t>
+            </a:r>
+            <a:r>
+              <a:rPr lang="en-US" altLang="en-GB">
+                <a:sym typeface="+mn-ea"/>
+              </a:rPr>
+              <a:t>actualResult</a:t>
+            </a:r>
+            <a:r>
+              <a:rPr lang="en-US" altLang="en-GB">
+                <a:solidFill>
+                  <a:srgbClr val="FA919B"/>
+                </a:solidFill>
+                <a:sym typeface="+mn-ea"/>
+              </a:rPr>
+              <a:t>)</a:t>
+            </a:r>
+            <a:r>
+              <a:rPr lang="vi-VN" altLang="en-US">
+                <a:solidFill>
+                  <a:srgbClr val="FA919B"/>
+                </a:solidFill>
+                <a:sym typeface="+mn-ea"/>
+              </a:rPr>
+              <a:t>.</a:t>
+            </a:r>
+            <a:r>
+              <a:rPr lang="en-US" altLang="en-GB">
+                <a:solidFill>
+                  <a:srgbClr val="FA919B"/>
+                </a:solidFill>
+                <a:sym typeface="+mn-ea"/>
+              </a:rPr>
+              <a:t>toBeLessThan(</a:t>
+            </a:r>
+            <a:r>
+              <a:rPr lang="en-US" altLang="en-GB">
+                <a:sym typeface="+mn-ea"/>
+              </a:rPr>
+              <a:t>expectedValue</a:t>
+            </a:r>
+            <a:r>
+              <a:rPr lang="en-US" altLang="en-GB">
+                <a:solidFill>
+                  <a:srgbClr val="FA919B"/>
+                </a:solidFill>
+                <a:sym typeface="+mn-ea"/>
+              </a:rPr>
+              <a:t>)</a:t>
+            </a:r>
+            <a:endParaRPr lang="en-US" altLang="en-GB">
+              <a:solidFill>
+                <a:srgbClr val="FA919B"/>
+              </a:solidFill>
+              <a:sym typeface="+mn-ea"/>
+            </a:endParaRPr>
+          </a:p>
+        </p:txBody>
+      </p:sp>
+      <p:sp>
+        <p:nvSpPr>
+          <p:cNvPr id="5" name="Google Shape;285;p40"/>
+          <p:cNvSpPr txBox="1"/>
+          <p:nvPr/>
+        </p:nvSpPr>
+        <p:spPr>
+          <a:xfrm>
+            <a:off x="3743960" y="2499360"/>
+            <a:ext cx="504190" cy="572770"/>
+          </a:xfrm>
+          <a:prstGeom prst="rect">
+            <a:avLst/>
+          </a:prstGeom>
+          <a:noFill/>
+          <a:ln>
+            <a:noFill/>
+          </a:ln>
+        </p:spPr>
+        <p:txBody>
+          <a:bodyPr wrap="square" lIns="91425" tIns="91425" rIns="91425" bIns="91425" anchor="t" anchorCtr="0">
+            <a:noAutofit/>
+          </a:bodyPr>
+          <a:lstStyle>
+            <a:defPPr marR="0" lvl="0" algn="l" rtl="0">
+              <a:lnSpc>
+                <a:spcPct val="100000"/>
+              </a:lnSpc>
+              <a:spcBef>
+                <a:spcPts val="0"/>
+              </a:spcBef>
+              <a:spcAft>
+                <a:spcPts val="0"/>
+              </a:spcAft>
+            </a:defPPr>
+            <a:lvl1pPr marR="0" lvl="0" algn="l" rtl="0">
+              <a:lnSpc>
+                <a:spcPct val="100000"/>
+              </a:lnSpc>
+              <a:spcBef>
+                <a:spcPts val="0"/>
+              </a:spcBef>
+              <a:spcAft>
+                <a:spcPts val="0"/>
+              </a:spcAft>
+              <a:buClr>
+                <a:schemeClr val="dk1"/>
+              </a:buClr>
+              <a:buSzPts val="3000"/>
+              <a:buFont typeface="Vidaloka" panose="02000504000000020004"/>
+              <a:buNone/>
+              <a:defRPr sz="3000" b="0" i="0" u="none" strike="noStrike" cap="none">
+                <a:solidFill>
+                  <a:schemeClr val="dk1"/>
+                </a:solidFill>
+                <a:latin typeface="Vidaloka" panose="02000504000000020004"/>
+                <a:ea typeface="Vidaloka" panose="02000504000000020004"/>
+                <a:cs typeface="Vidaloka" panose="02000504000000020004"/>
+                <a:sym typeface="Vidaloka" panose="02000504000000020004"/>
+              </a:defRPr>
+            </a:lvl1pPr>
+            <a:lvl2pPr marR="0" lvl="1" algn="l" rtl="0">
+              <a:lnSpc>
+                <a:spcPct val="100000"/>
+              </a:lnSpc>
+              <a:spcBef>
+                <a:spcPts val="0"/>
+              </a:spcBef>
+              <a:spcAft>
+                <a:spcPts val="0"/>
+              </a:spcAft>
+              <a:buClr>
+                <a:schemeClr val="dk1"/>
+              </a:buClr>
+              <a:buSzPts val="3000"/>
+              <a:buFont typeface="Arial" panose="020B0604020202020204"/>
+              <a:buNone/>
+              <a:defRPr sz="3000" b="0" i="1" u="none" strike="noStrike" cap="none">
+                <a:solidFill>
+                  <a:schemeClr val="dk1"/>
+                </a:solidFill>
+                <a:latin typeface="Arial" panose="020B0604020202020204"/>
+                <a:ea typeface="Arial" panose="020B0604020202020204"/>
+                <a:cs typeface="Arial" panose="020B0604020202020204"/>
+                <a:sym typeface="Arial" panose="020B0604020202020204"/>
+              </a:defRPr>
+            </a:lvl2pPr>
+            <a:lvl3pPr marR="0" lvl="2" algn="l" rtl="0">
+              <a:lnSpc>
+                <a:spcPct val="100000"/>
+              </a:lnSpc>
+              <a:spcBef>
+                <a:spcPts val="0"/>
+              </a:spcBef>
+              <a:spcAft>
+                <a:spcPts val="0"/>
+              </a:spcAft>
+              <a:buClr>
+                <a:schemeClr val="dk1"/>
+              </a:buClr>
+              <a:buSzPts val="3000"/>
+              <a:buFont typeface="Arial" panose="020B0604020202020204"/>
+              <a:buNone/>
+              <a:defRPr sz="3000" b="0" i="1" u="none" strike="noStrike" cap="none">
+                <a:solidFill>
+                  <a:schemeClr val="dk1"/>
+                </a:solidFill>
+                <a:latin typeface="Arial" panose="020B0604020202020204"/>
+                <a:ea typeface="Arial" panose="020B0604020202020204"/>
+                <a:cs typeface="Arial" panose="020B0604020202020204"/>
+                <a:sym typeface="Arial" panose="020B0604020202020204"/>
+              </a:defRPr>
+            </a:lvl3pPr>
+            <a:lvl4pPr marR="0" lvl="3" algn="l" rtl="0">
+              <a:lnSpc>
+                <a:spcPct val="100000"/>
+              </a:lnSpc>
+              <a:spcBef>
+                <a:spcPts val="0"/>
+              </a:spcBef>
+              <a:spcAft>
+                <a:spcPts val="0"/>
+              </a:spcAft>
+              <a:buClr>
+                <a:schemeClr val="dk1"/>
+              </a:buClr>
+              <a:buSzPts val="3000"/>
+              <a:buFont typeface="Arial" panose="020B0604020202020204"/>
+              <a:buNone/>
+              <a:defRPr sz="3000" b="0" i="1" u="none" strike="noStrike" cap="none">
+                <a:solidFill>
+                  <a:schemeClr val="dk1"/>
+                </a:solidFill>
+                <a:latin typeface="Arial" panose="020B0604020202020204"/>
+                <a:ea typeface="Arial" panose="020B0604020202020204"/>
+                <a:cs typeface="Arial" panose="020B0604020202020204"/>
+                <a:sym typeface="Arial" panose="020B0604020202020204"/>
+              </a:defRPr>
+            </a:lvl4pPr>
+            <a:lvl5pPr marR="0" lvl="4" algn="l" rtl="0">
+              <a:lnSpc>
+                <a:spcPct val="100000"/>
+              </a:lnSpc>
+              <a:spcBef>
+                <a:spcPts val="0"/>
+              </a:spcBef>
+              <a:spcAft>
+                <a:spcPts val="0"/>
+              </a:spcAft>
+              <a:buClr>
+                <a:schemeClr val="dk1"/>
+              </a:buClr>
+              <a:buSzPts val="3000"/>
+              <a:buFont typeface="Arial" panose="020B0604020202020204"/>
+              <a:buNone/>
+              <a:defRPr sz="3000" b="0" i="1" u="none" strike="noStrike" cap="none">
+                <a:solidFill>
+                  <a:schemeClr val="dk1"/>
+                </a:solidFill>
+                <a:latin typeface="Arial" panose="020B0604020202020204"/>
+                <a:ea typeface="Arial" panose="020B0604020202020204"/>
+                <a:cs typeface="Arial" panose="020B0604020202020204"/>
+                <a:sym typeface="Arial" panose="020B0604020202020204"/>
+              </a:defRPr>
+            </a:lvl5pPr>
+            <a:lvl6pPr marR="0" lvl="5" algn="l" rtl="0">
+              <a:lnSpc>
+                <a:spcPct val="100000"/>
+              </a:lnSpc>
+              <a:spcBef>
+                <a:spcPts val="0"/>
+              </a:spcBef>
+              <a:spcAft>
+                <a:spcPts val="0"/>
+              </a:spcAft>
+              <a:buClr>
+                <a:schemeClr val="dk1"/>
+              </a:buClr>
+              <a:buSzPts val="3000"/>
+              <a:buFont typeface="Arial" panose="020B0604020202020204"/>
+              <a:buNone/>
+              <a:defRPr sz="3000" b="0" i="1" u="none" strike="noStrike" cap="none">
+                <a:solidFill>
+                  <a:schemeClr val="dk1"/>
+                </a:solidFill>
+                <a:latin typeface="Arial" panose="020B0604020202020204"/>
+                <a:ea typeface="Arial" panose="020B0604020202020204"/>
+                <a:cs typeface="Arial" panose="020B0604020202020204"/>
+                <a:sym typeface="Arial" panose="020B0604020202020204"/>
+              </a:defRPr>
+            </a:lvl6pPr>
+            <a:lvl7pPr marR="0" lvl="6" algn="l" rtl="0">
+              <a:lnSpc>
+                <a:spcPct val="100000"/>
+              </a:lnSpc>
+              <a:spcBef>
+                <a:spcPts val="0"/>
+              </a:spcBef>
+              <a:spcAft>
+                <a:spcPts val="0"/>
+              </a:spcAft>
+              <a:buClr>
+                <a:schemeClr val="dk1"/>
+              </a:buClr>
+              <a:buSzPts val="3000"/>
+              <a:buFont typeface="Arial" panose="020B0604020202020204"/>
+              <a:buNone/>
+              <a:defRPr sz="3000" b="0" i="1" u="none" strike="noStrike" cap="none">
+                <a:solidFill>
+                  <a:schemeClr val="dk1"/>
+                </a:solidFill>
+                <a:latin typeface="Arial" panose="020B0604020202020204"/>
+                <a:ea typeface="Arial" panose="020B0604020202020204"/>
+                <a:cs typeface="Arial" panose="020B0604020202020204"/>
+                <a:sym typeface="Arial" panose="020B0604020202020204"/>
+              </a:defRPr>
+            </a:lvl7pPr>
+            <a:lvl8pPr marR="0" lvl="7" algn="l" rtl="0">
+              <a:lnSpc>
+                <a:spcPct val="100000"/>
+              </a:lnSpc>
+              <a:spcBef>
+                <a:spcPts val="0"/>
+              </a:spcBef>
+              <a:spcAft>
+                <a:spcPts val="0"/>
+              </a:spcAft>
+              <a:buClr>
+                <a:schemeClr val="dk1"/>
+              </a:buClr>
+              <a:buSzPts val="3000"/>
+              <a:buFont typeface="Arial" panose="020B0604020202020204"/>
+              <a:buNone/>
+              <a:defRPr sz="3000" b="0" i="1" u="none" strike="noStrike" cap="none">
+                <a:solidFill>
+                  <a:schemeClr val="dk1"/>
+                </a:solidFill>
+                <a:latin typeface="Arial" panose="020B0604020202020204"/>
+                <a:ea typeface="Arial" panose="020B0604020202020204"/>
+                <a:cs typeface="Arial" panose="020B0604020202020204"/>
+                <a:sym typeface="Arial" panose="020B0604020202020204"/>
+              </a:defRPr>
+            </a:lvl8pPr>
+            <a:lvl9pPr marR="0" lvl="8" algn="l" rtl="0">
+              <a:lnSpc>
+                <a:spcPct val="100000"/>
+              </a:lnSpc>
+              <a:spcBef>
+                <a:spcPts val="0"/>
+              </a:spcBef>
+              <a:spcAft>
+                <a:spcPts val="0"/>
+              </a:spcAft>
+              <a:buClr>
+                <a:schemeClr val="dk1"/>
+              </a:buClr>
+              <a:buSzPts val="3000"/>
+              <a:buFont typeface="Arial" panose="020B0604020202020204"/>
+              <a:buNone/>
+              <a:defRPr sz="3000" b="0" i="1" u="none" strike="noStrike" cap="none">
+                <a:solidFill>
+                  <a:schemeClr val="dk1"/>
+                </a:solidFill>
+                <a:latin typeface="Arial" panose="020B0604020202020204"/>
+                <a:ea typeface="Arial" panose="020B0604020202020204"/>
+                <a:cs typeface="Arial" panose="020B0604020202020204"/>
+                <a:sym typeface="Arial" panose="020B0604020202020204"/>
+              </a:defRPr>
+            </a:lvl9pPr>
+          </a:lstStyle>
+          <a:p>
+            <a:pPr marL="0" lvl="0" indent="0" algn="l" rtl="0">
+              <a:spcBef>
+                <a:spcPts val="0"/>
+              </a:spcBef>
+              <a:spcAft>
+                <a:spcPts val="0"/>
+              </a:spcAft>
+              <a:buNone/>
+            </a:pPr>
+            <a:r>
+              <a:rPr lang="en-US">
+                <a:solidFill>
+                  <a:srgbClr val="FA919B"/>
+                </a:solidFill>
+                <a:sym typeface="+mn-ea"/>
+              </a:rPr>
+              <a:t>...</a:t>
+            </a:r>
+            <a:endParaRPr lang="en-US">
               <a:solidFill>
                 <a:srgbClr val="FA919B"/>
               </a:solidFill>

</xml_diff>

<commit_message>
update ci with mssql
</commit_message>
<xml_diff>
--- a/SWT.pptx
+++ b/SWT.pptx
@@ -28059,7 +28059,7 @@
       </p:pic>
       <p:pic>
         <p:nvPicPr>
-          <p:cNvPr id="1" name="Picture 0"/>
+          <p:cNvPr id="3" name="Picture 2"/>
           <p:cNvPicPr>
             <a:picLocks noChangeAspect="1"/>
           </p:cNvPicPr>
@@ -30830,7 +30830,7 @@
               </a:r>
               <a:r>
                 <a:rPr lang="en-US" altLang="en-GB" i="1">
-                  <a:hlinkClick r:id="rId1" tooltip="" action="ppaction://hlinkfile"/>
+                  <a:hlinkClick r:id="rId1" action="ppaction://hlinkfile"/>
                 </a:rPr>
                 <a:t>Christoph Nakazawa</a:t>
               </a:r>
@@ -32298,7 +32298,14 @@
               </a:rPr>
               <a:t>Scope</a:t>
             </a:r>
-            <a:endParaRPr lang="en-US" sz="3200">
+            <a:r>
+              <a:rPr lang="vi-VN" altLang="en-US" sz="3200">
+                <a:latin typeface="Vidaloka" panose="02000504000000020004" charset="0"/>
+                <a:cs typeface="Vidaloka" panose="02000504000000020004" charset="0"/>
+              </a:rPr>
+              <a:t> : test suits</a:t>
+            </a:r>
+            <a:endParaRPr lang="vi-VN" altLang="en-US" sz="3200">
               <a:latin typeface="Vidaloka" panose="02000504000000020004" charset="0"/>
               <a:cs typeface="Vidaloka" panose="02000504000000020004" charset="0"/>
             </a:endParaRPr>
@@ -32523,7 +32530,7 @@
       </p:sp>
       <p:sp>
         <p:nvSpPr>
-          <p:cNvPr id="1" name="Text Box 0"/>
+          <p:cNvPr id="2" name="Text Box 1"/>
           <p:cNvSpPr txBox="1"/>
           <p:nvPr/>
         </p:nvSpPr>
@@ -32549,7 +32556,14 @@
               </a:rPr>
               <a:t>Scope</a:t>
             </a:r>
-            <a:endParaRPr lang="en-US" sz="3200">
+            <a:r>
+              <a:rPr lang="vi-VN" altLang="en-US" sz="3200">
+                <a:latin typeface="Vidaloka" panose="02000504000000020004" charset="0"/>
+                <a:cs typeface="Vidaloka" panose="02000504000000020004" charset="0"/>
+              </a:rPr>
+              <a:t> : test</a:t>
+            </a:r>
+            <a:endParaRPr lang="vi-VN" altLang="en-US" sz="3200">
               <a:latin typeface="Vidaloka" panose="02000504000000020004" charset="0"/>
               <a:cs typeface="Vidaloka" panose="02000504000000020004" charset="0"/>
             </a:endParaRPr>
@@ -32591,7 +32605,7 @@
         </p:nvSpPr>
         <p:spPr>
           <a:xfrm>
-            <a:off x="611505" y="2931795"/>
+            <a:off x="612140" y="2718435"/>
             <a:ext cx="7794625" cy="2393315"/>
           </a:xfrm>
           <a:prstGeom prst="rect">
@@ -32676,7 +32690,15 @@
             </a:pPr>
             <a:r>
               <a:rPr lang="en-US" altLang="en-GB" sz="1800"/>
-              <a:t>Usually be:</a:t>
+              <a:t>Usually </a:t>
+            </a:r>
+            <a:r>
+              <a:rPr lang="vi-VN" altLang="en-US" sz="1800"/>
+              <a:t>used</a:t>
+            </a:r>
+            <a:r>
+              <a:rPr lang="en-US" altLang="en-GB" sz="1800"/>
+              <a:t>:</a:t>
             </a:r>
             <a:endParaRPr lang="en-US" altLang="en-GB" sz="1800"/>
           </a:p>
@@ -32785,6 +32807,79 @@
                 <a:sym typeface="+mn-ea"/>
               </a:rPr>
               <a:t>toEqual</a:t>
+            </a:r>
+            <a:r>
+              <a:rPr lang="en-US" altLang="en-GB" sz="1800">
+                <a:solidFill>
+                  <a:srgbClr val="FA919B"/>
+                </a:solidFill>
+                <a:sym typeface="+mn-ea"/>
+              </a:rPr>
+              <a:t>(</a:t>
+            </a:r>
+            <a:r>
+              <a:rPr lang="en-US" altLang="en-GB" sz="1800">
+                <a:sym typeface="+mn-ea"/>
+              </a:rPr>
+              <a:t>expectedValue</a:t>
+            </a:r>
+            <a:r>
+              <a:rPr lang="en-US" altLang="en-GB" sz="1800">
+                <a:solidFill>
+                  <a:srgbClr val="FA919B"/>
+                </a:solidFill>
+                <a:sym typeface="+mn-ea"/>
+              </a:rPr>
+              <a:t>)</a:t>
+            </a:r>
+            <a:endParaRPr lang="en-US" altLang="en-GB" sz="1800">
+              <a:solidFill>
+                <a:srgbClr val="FA919B"/>
+              </a:solidFill>
+              <a:sym typeface="+mn-ea"/>
+            </a:endParaRPr>
+          </a:p>
+          <a:p>
+            <a:pPr marL="742950" lvl="1" indent="-285750" algn="l" rtl="0">
+              <a:spcBef>
+                <a:spcPts val="0"/>
+              </a:spcBef>
+              <a:spcAft>
+                <a:spcPts val="0"/>
+              </a:spcAft>
+            </a:pPr>
+            <a:r>
+              <a:rPr lang="en-US" altLang="en-GB" sz="1800" i="1">
+                <a:solidFill>
+                  <a:srgbClr val="FA919B"/>
+                </a:solidFill>
+                <a:sym typeface="+mn-ea"/>
+              </a:rPr>
+              <a:t>expect(</a:t>
+            </a:r>
+            <a:r>
+              <a:rPr lang="en-US" altLang="en-GB" sz="1800">
+                <a:sym typeface="+mn-ea"/>
+              </a:rPr>
+              <a:t>actualResult</a:t>
+            </a:r>
+            <a:r>
+              <a:rPr lang="en-US" altLang="en-GB" sz="1800" i="1">
+                <a:solidFill>
+                  <a:srgbClr val="FA919B"/>
+                </a:solidFill>
+                <a:sym typeface="+mn-ea"/>
+              </a:rPr>
+              <a:t>).</a:t>
+            </a:r>
+            <a:r>
+              <a:rPr lang="vi-VN" altLang="en-US" sz="1800" i="1">
+                <a:solidFill>
+                  <a:srgbClr val="FA919B"/>
+                </a:solidFill>
+                <a:sym typeface="+mn-ea"/>
+              </a:rPr>
+              <a:t>toThrow</a:t>
             </a:r>
             <a:r>
               <a:rPr lang="en-US" altLang="en-GB" sz="1800">
@@ -32872,7 +32967,7 @@
         </p:nvSpPr>
         <p:spPr>
           <a:xfrm>
-            <a:off x="467360" y="1059815"/>
+            <a:off x="467995" y="846455"/>
             <a:ext cx="8449310" cy="572770"/>
           </a:xfrm>
           <a:prstGeom prst="rect">
@@ -32962,13 +33057,13 @@
       </p:sp>
       <p:sp>
         <p:nvSpPr>
-          <p:cNvPr id="1" name="Text Box 0"/>
+          <p:cNvPr id="2" name="Text Box 1"/>
           <p:cNvSpPr txBox="1"/>
           <p:nvPr/>
         </p:nvSpPr>
         <p:spPr>
           <a:xfrm>
-            <a:off x="251460" y="483870"/>
+            <a:off x="252095" y="270510"/>
             <a:ext cx="7489190" cy="583565"/>
           </a:xfrm>
           <a:prstGeom prst="rect">
@@ -33003,7 +33098,7 @@
         </p:nvSpPr>
         <p:spPr>
           <a:xfrm>
-            <a:off x="467360" y="1632585"/>
+            <a:off x="467995" y="1419225"/>
             <a:ext cx="8449310" cy="572770"/>
           </a:xfrm>
           <a:prstGeom prst="rect">
@@ -33349,7 +33444,7 @@
         </p:nvSpPr>
         <p:spPr>
           <a:xfrm>
-            <a:off x="467360" y="2205355"/>
+            <a:off x="467995" y="1991995"/>
             <a:ext cx="8654415" cy="572770"/>
           </a:xfrm>
           <a:prstGeom prst="rect">
@@ -33695,7 +33790,7 @@
         </p:nvSpPr>
         <p:spPr>
           <a:xfrm>
-            <a:off x="3743960" y="2499360"/>
+            <a:off x="3744595" y="2286000"/>
             <a:ext cx="504190" cy="572770"/>
           </a:xfrm>
           <a:prstGeom prst="rect">

</xml_diff>